<commit_message>
bouncing_ball: function and class step-by-step development examples
</commit_message>
<xml_diff>
--- a/Docs/ForTheBlind/Implementing Visually Impaired Introduction.pptx
+++ b/Docs/ForTheBlind/Implementing Visually Impaired Introduction.pptx
@@ -221,7 +221,7 @@
           <a:p>
             <a:fld id="{656D2E9F-587F-4929-A615-D1B22C008AE4}" type="datetimeFigureOut">
               <a:rPr lang="en-US" smtClean="0"/>
-              <a:t>3/1/2023</a:t>
+              <a:t>2/2/2024</a:t>
             </a:fld>
             <a:endParaRPr lang="en-US" dirty="0"/>
           </a:p>
@@ -652,7 +652,7 @@
                 <a:tabLst/>
                 <a:defRPr/>
               </a:pPr>
-              <a:t>3/1/2023</a:t>
+              <a:t>2/2/2024</a:t>
             </a:fld>
             <a:endParaRPr kumimoji="0" lang="en-US" sz="1200" b="0" i="0" u="none" strike="noStrike" kern="1200" cap="none" spc="0" normalizeH="0" baseline="0" noProof="0" dirty="0">
               <a:ln>
@@ -1415,7 +1415,7 @@
                 <a:tabLst/>
                 <a:defRPr/>
               </a:pPr>
-              <a:t>3/1/2023</a:t>
+              <a:t>2/2/2024</a:t>
             </a:fld>
             <a:endParaRPr kumimoji="0" lang="en-US" sz="1200" b="0" i="0" u="none" strike="noStrike" kern="1200" cap="none" spc="0" normalizeH="0" baseline="0" noProof="0" dirty="0">
               <a:ln>
@@ -1746,7 +1746,7 @@
                 <a:tabLst/>
                 <a:defRPr/>
               </a:pPr>
-              <a:t>3/1/2023</a:t>
+              <a:t>2/2/2024</a:t>
             </a:fld>
             <a:endParaRPr kumimoji="0" lang="en-US" sz="1200" b="0" i="0" u="none" strike="noStrike" kern="1200" cap="none" spc="0" normalizeH="0" baseline="0" noProof="0" dirty="0">
               <a:ln>
@@ -2077,7 +2077,7 @@
                 <a:tabLst/>
                 <a:defRPr/>
               </a:pPr>
-              <a:t>3/1/2023</a:t>
+              <a:t>2/2/2024</a:t>
             </a:fld>
             <a:endParaRPr kumimoji="0" lang="en-US" sz="1200" b="0" i="0" u="none" strike="noStrike" kern="1200" cap="none" spc="0" normalizeH="0" baseline="0" noProof="0" dirty="0">
               <a:ln>
@@ -2408,7 +2408,7 @@
                 <a:tabLst/>
                 <a:defRPr/>
               </a:pPr>
-              <a:t>3/1/2023</a:t>
+              <a:t>2/2/2024</a:t>
             </a:fld>
             <a:endParaRPr kumimoji="0" lang="en-US" sz="1200" b="0" i="0" u="none" strike="noStrike" kern="1200" cap="none" spc="0" normalizeH="0" baseline="0" noProof="0" dirty="0">
               <a:ln>
@@ -2771,7 +2771,7 @@
                 <a:tabLst/>
                 <a:defRPr/>
               </a:pPr>
-              <a:t>3/1/2023</a:t>
+              <a:t>2/2/2024</a:t>
             </a:fld>
             <a:endParaRPr kumimoji="0" lang="en-US" sz="1200" b="0" i="0" u="none" strike="noStrike" kern="1200" cap="none" spc="0" normalizeH="0" baseline="0" noProof="0" dirty="0">
               <a:ln>
@@ -3105,7 +3105,7 @@
                 <a:tabLst/>
                 <a:defRPr/>
               </a:pPr>
-              <a:t>3/1/2023</a:t>
+              <a:t>2/2/2024</a:t>
             </a:fld>
             <a:endParaRPr kumimoji="0" lang="en-US" sz="1200" b="0" i="0" u="none" strike="noStrike" kern="1200" cap="none" spc="0" normalizeH="0" baseline="0" noProof="0" dirty="0">
               <a:ln>
@@ -3439,7 +3439,7 @@
                 <a:tabLst/>
                 <a:defRPr/>
               </a:pPr>
-              <a:t>3/1/2023</a:t>
+              <a:t>2/2/2024</a:t>
             </a:fld>
             <a:endParaRPr kumimoji="0" lang="en-US" sz="1200" b="0" i="0" u="none" strike="noStrike" kern="1200" cap="none" spc="0" normalizeH="0" baseline="0" noProof="0" dirty="0">
               <a:ln>
@@ -4508,7 +4508,7 @@
           <a:p>
             <a:fld id="{B1DF5501-EE91-4443-9D3B-24E6F28D34E2}" type="datetime1">
               <a:rPr lang="en-US" smtClean="0"/>
-              <a:t>3/1/2023</a:t>
+              <a:t>2/2/2024</a:t>
             </a:fld>
             <a:endParaRPr lang="en-US" dirty="0"/>
           </a:p>
@@ -4774,7 +4774,7 @@
           <a:p>
             <a:fld id="{E954E1E9-8456-43AD-BA28-861520D256B9}" type="datetime1">
               <a:rPr lang="en-US" smtClean="0"/>
-              <a:t>3/1/2023</a:t>
+              <a:t>2/2/2024</a:t>
             </a:fld>
             <a:endParaRPr lang="en-US" dirty="0"/>
           </a:p>
@@ -5092,7 +5092,7 @@
           <a:p>
             <a:fld id="{FAF31E0C-AAFD-4E63-B3AE-16CD757951F4}" type="datetime1">
               <a:rPr lang="en-US" smtClean="0"/>
-              <a:t>3/1/2023</a:t>
+              <a:t>2/2/2024</a:t>
             </a:fld>
             <a:endParaRPr lang="en-US" dirty="0"/>
           </a:p>
@@ -5437,7 +5437,7 @@
           <a:p>
             <a:fld id="{000084FF-4715-4B6E-BD22-453621E5873F}" type="datetime1">
               <a:rPr lang="en-US" smtClean="0"/>
-              <a:t>3/1/2023</a:t>
+              <a:t>2/2/2024</a:t>
             </a:fld>
             <a:endParaRPr lang="en-US" dirty="0"/>
           </a:p>
@@ -5755,7 +5755,7 @@
           <a:p>
             <a:fld id="{6AC37F8D-4DF5-4AB6-A766-5A84B3D74A3B}" type="datetime1">
               <a:rPr lang="en-US" smtClean="0"/>
-              <a:t>3/1/2023</a:t>
+              <a:t>2/2/2024</a:t>
             </a:fld>
             <a:endParaRPr lang="en-US" dirty="0"/>
           </a:p>
@@ -6152,7 +6152,7 @@
           <a:p>
             <a:fld id="{1BF3CD1A-162D-40B2-9B22-9056F77C27F2}" type="datetime1">
               <a:rPr lang="en-US" smtClean="0"/>
-              <a:t>3/1/2023</a:t>
+              <a:t>2/2/2024</a:t>
             </a:fld>
             <a:endParaRPr lang="en-US" dirty="0"/>
           </a:p>
@@ -6326,7 +6326,7 @@
           <a:p>
             <a:fld id="{D42E4200-B1E5-4E39-8279-05DD69810A37}" type="datetime1">
               <a:rPr lang="en-US" smtClean="0"/>
-              <a:t>3/1/2023</a:t>
+              <a:t>2/2/2024</a:t>
             </a:fld>
             <a:endParaRPr lang="en-US" dirty="0"/>
           </a:p>
@@ -6509,7 +6509,7 @@
           <a:p>
             <a:fld id="{47CF7895-00AC-42E5-9790-7B0E3CE09DF2}" type="datetime1">
               <a:rPr lang="en-US" smtClean="0"/>
-              <a:t>3/1/2023</a:t>
+              <a:t>2/2/2024</a:t>
             </a:fld>
             <a:endParaRPr lang="en-US" dirty="0"/>
           </a:p>
@@ -6688,7 +6688,7 @@
           <a:p>
             <a:fld id="{A7119916-CD40-456D-ABE3-55F8822671F7}" type="datetime1">
               <a:rPr lang="en-US" smtClean="0"/>
-              <a:t>3/1/2023</a:t>
+              <a:t>2/2/2024</a:t>
             </a:fld>
             <a:endParaRPr lang="en-US" dirty="0"/>
           </a:p>
@@ -6938,7 +6938,7 @@
           <a:p>
             <a:fld id="{3F9A13D6-B8C2-463B-B3F7-C62E098B328E}" type="datetime1">
               <a:rPr lang="en-US" smtClean="0"/>
-              <a:t>3/1/2023</a:t>
+              <a:t>2/2/2024</a:t>
             </a:fld>
             <a:endParaRPr lang="en-US" dirty="0"/>
           </a:p>
@@ -7173,7 +7173,7 @@
           <a:p>
             <a:fld id="{D2B63420-31EE-4E4B-911C-2601B14D9FDD}" type="datetime1">
               <a:rPr lang="en-US" smtClean="0"/>
-              <a:t>3/1/2023</a:t>
+              <a:t>2/2/2024</a:t>
             </a:fld>
             <a:endParaRPr lang="en-US" dirty="0"/>
           </a:p>
@@ -7550,7 +7550,7 @@
           <a:p>
             <a:fld id="{2DD8986D-86F8-41E6-8CFF-8C91AEF92622}" type="datetime1">
               <a:rPr lang="en-US" smtClean="0"/>
-              <a:t>3/1/2023</a:t>
+              <a:t>2/2/2024</a:t>
             </a:fld>
             <a:endParaRPr lang="en-US" dirty="0"/>
           </a:p>
@@ -7676,7 +7676,7 @@
           <a:p>
             <a:fld id="{BA885161-032E-4C6A-8EDA-39D168DF18E4}" type="datetime1">
               <a:rPr lang="en-US" smtClean="0"/>
-              <a:t>3/1/2023</a:t>
+              <a:t>2/2/2024</a:t>
             </a:fld>
             <a:endParaRPr lang="en-US" dirty="0"/>
           </a:p>
@@ -7774,7 +7774,7 @@
           <a:p>
             <a:fld id="{958E6740-E523-48D9-9C4E-6F218E87BAF3}" type="datetime1">
               <a:rPr lang="en-US" smtClean="0"/>
-              <a:t>3/1/2023</a:t>
+              <a:t>2/2/2024</a:t>
             </a:fld>
             <a:endParaRPr lang="en-US" dirty="0"/>
           </a:p>
@@ -8032,7 +8032,7 @@
           <a:p>
             <a:fld id="{6121D4CA-FF09-4CB8-8D51-2613D19A0F2E}" type="datetime1">
               <a:rPr lang="en-US" smtClean="0"/>
-              <a:t>3/1/2023</a:t>
+              <a:t>2/2/2024</a:t>
             </a:fld>
             <a:endParaRPr lang="en-US" dirty="0"/>
           </a:p>
@@ -8297,7 +8297,7 @@
           <a:p>
             <a:fld id="{8C4779EA-AEA7-43B3-9B65-A77E9A890421}" type="datetime1">
               <a:rPr lang="en-US" smtClean="0"/>
-              <a:t>3/1/2023</a:t>
+              <a:t>2/2/2024</a:t>
             </a:fld>
             <a:endParaRPr lang="en-US" dirty="0"/>
           </a:p>
@@ -9043,7 +9043,7 @@
           <a:p>
             <a:fld id="{059A67F1-3EA0-4026-BE6A-31EE4E1B1DB5}" type="datetime1">
               <a:rPr lang="en-US" smtClean="0"/>
-              <a:t>3/1/2023</a:t>
+              <a:t>2/2/2024</a:t>
             </a:fld>
             <a:endParaRPr lang="en-US" dirty="0"/>
           </a:p>
@@ -9644,7 +9644,7 @@
               </a:spcAft>
             </a:pPr>
             <a:r>
-              <a:rPr lang="en-US" sz="6000" kern="1400" spc="-50" dirty="0">
+              <a:rPr lang="en-US" sz="6600" kern="1400" spc="-50" dirty="0">
                 <a:effectLst/>
                 <a:latin typeface="Calibri Light" panose="020F0302020204030204" pitchFamily="34" charset="0"/>
                 <a:ea typeface="Times New Roman" panose="02020603050405020304" pitchFamily="18" charset="0"/>
@@ -9653,7 +9653,7 @@
               <a:t>Implementing Turtle Braille</a:t>
             </a:r>
             <a:br>
-              <a:rPr lang="en-US" sz="6000" kern="1400" spc="-50" dirty="0">
+              <a:rPr lang="en-US" sz="6600" kern="1400" spc="-50" dirty="0">
                 <a:effectLst/>
                 <a:latin typeface="Calibri Light" panose="020F0302020204030204" pitchFamily="34" charset="0"/>
                 <a:ea typeface="Times New Roman" panose="02020603050405020304" pitchFamily="18" charset="0"/>
@@ -9661,57 +9661,23 @@
               </a:rPr>
             </a:br>
             <a:r>
+              <a:rPr lang="en-US" sz="6600" dirty="0">
+                <a:effectLst/>
+                <a:latin typeface="Calibri" panose="020F0502020204030204" pitchFamily="34" charset="0"/>
+                <a:ea typeface="Calibri" panose="020F0502020204030204" pitchFamily="34" charset="0"/>
+                <a:cs typeface="Times New Roman" panose="02020603050405020304" pitchFamily="18" charset="0"/>
+              </a:rPr>
+              <a:t>A tool to help the blind "see" simple graphics</a:t>
+            </a:r>
+            <a:br>
               <a:rPr lang="en-US" sz="6000" dirty="0">
                 <a:effectLst/>
                 <a:latin typeface="Calibri" panose="020F0502020204030204" pitchFamily="34" charset="0"/>
                 <a:ea typeface="Calibri" panose="020F0502020204030204" pitchFamily="34" charset="0"/>
                 <a:cs typeface="Times New Roman" panose="02020603050405020304" pitchFamily="18" charset="0"/>
               </a:rPr>
-              <a:t>One Pixel at a Time</a:t>
-            </a:r>
+            </a:br>
             <a:endParaRPr lang="en-US" sz="6000" dirty="0"/>
-          </a:p>
-        </p:txBody>
-      </p:sp>
-      <p:sp>
-        <p:nvSpPr>
-          <p:cNvPr id="3" name="Content Placeholder 2">
-            <a:extLst>
-              <a:ext uri="{FF2B5EF4-FFF2-40B4-BE49-F238E27FC236}">
-                <a16:creationId xmlns:a16="http://schemas.microsoft.com/office/drawing/2014/main" id="{B25115FD-141E-48C6-A3F1-61C4558CC9C7}"/>
-              </a:ext>
-            </a:extLst>
-          </p:cNvPr>
-          <p:cNvSpPr>
-            <a:spLocks noGrp="1"/>
-          </p:cNvSpPr>
-          <p:nvPr>
-            <p:ph idx="1"/>
-          </p:nvPr>
-        </p:nvSpPr>
-        <p:spPr>
-          <a:xfrm>
-            <a:off x="677334" y="4405023"/>
-            <a:ext cx="8596668" cy="1636339"/>
-          </a:xfrm>
-        </p:spPr>
-        <p:txBody>
-          <a:bodyPr>
-            <a:normAutofit/>
-          </a:bodyPr>
-          <a:lstStyle/>
-          <a:p>
-            <a:pPr marL="457200" lvl="1" indent="0">
-              <a:buNone/>
-            </a:pPr>
-            <a:r>
-              <a:rPr lang="en-US" sz="3400" i="1" dirty="0">
-                <a:solidFill>
-                  <a:schemeClr val="accent2"/>
-                </a:solidFill>
-              </a:rPr>
-              <a:t>A tool to help the blind "see" simple graphics</a:t>
-            </a:r>
           </a:p>
         </p:txBody>
       </p:sp>
@@ -9787,7 +9753,7 @@
                 <a:tabLst/>
                 <a:defRPr/>
               </a:pPr>
-              <a:t>3/1/2023</a:t>
+              <a:t>2/2/2024</a:t>
             </a:fld>
             <a:endParaRPr kumimoji="0" lang="en-US" sz="900" b="0" i="0" u="none" strike="noStrike" kern="1200" cap="none" spc="0" normalizeH="0" baseline="0" noProof="0" dirty="0">
               <a:ln>
@@ -10159,7 +10125,7 @@
           <a:p>
             <a:fld id="{A7119916-CD40-456D-ABE3-55F8822671F7}" type="datetime1">
               <a:rPr lang="en-US" smtClean="0"/>
-              <a:t>3/1/2023</a:t>
+              <a:t>2/2/2024</a:t>
             </a:fld>
             <a:endParaRPr lang="en-US" dirty="0"/>
           </a:p>
@@ -10498,7 +10464,7 @@
           <a:p>
             <a:fld id="{A7119916-CD40-456D-ABE3-55F8822671F7}" type="datetime1">
               <a:rPr lang="en-US" smtClean="0"/>
-              <a:t>3/1/2023</a:t>
+              <a:t>2/2/2024</a:t>
             </a:fld>
             <a:endParaRPr lang="en-US" dirty="0"/>
           </a:p>
@@ -11076,7 +11042,7 @@
           <a:p>
             <a:fld id="{A7119916-CD40-456D-ABE3-55F8822671F7}" type="datetime1">
               <a:rPr lang="en-US" smtClean="0"/>
-              <a:t>3/1/2023</a:t>
+              <a:t>2/2/2024</a:t>
             </a:fld>
             <a:endParaRPr lang="en-US" dirty="0"/>
           </a:p>
@@ -11600,7 +11566,7 @@
           <a:p>
             <a:fld id="{A7119916-CD40-456D-ABE3-55F8822671F7}" type="datetime1">
               <a:rPr lang="en-US" smtClean="0"/>
-              <a:t>3/1/2023</a:t>
+              <a:t>2/2/2024</a:t>
             </a:fld>
             <a:endParaRPr lang="en-US" dirty="0"/>
           </a:p>
@@ -12161,7 +12127,7 @@
           <a:p>
             <a:fld id="{A7119916-CD40-456D-ABE3-55F8822671F7}" type="datetime1">
               <a:rPr lang="en-US" smtClean="0"/>
-              <a:t>3/1/2023</a:t>
+              <a:t>2/2/2024</a:t>
             </a:fld>
             <a:endParaRPr lang="en-US" dirty="0"/>
           </a:p>
@@ -12643,7 +12609,7 @@
           <a:p>
             <a:fld id="{A7119916-CD40-456D-ABE3-55F8822671F7}" type="datetime1">
               <a:rPr lang="en-US" smtClean="0"/>
-              <a:t>3/1/2023</a:t>
+              <a:t>2/2/2024</a:t>
             </a:fld>
             <a:endParaRPr lang="en-US" dirty="0"/>
           </a:p>
@@ -12896,14 +12862,14 @@
             <p:ph idx="1"/>
             <p:extLst>
               <p:ext uri="{D42A27DB-BD31-4B8C-83A1-F6EECF244321}">
-                <p14:modId xmlns:p14="http://schemas.microsoft.com/office/powerpoint/2010/main" val="3419389144"/>
+                <p14:modId xmlns:p14="http://schemas.microsoft.com/office/powerpoint/2010/main" val="4014573959"/>
               </p:ext>
             </p:extLst>
           </p:nvPr>
         </p:nvGraphicFramePr>
         <p:xfrm>
-          <a:off x="22221" y="690825"/>
-          <a:ext cx="10557509" cy="5974080"/>
+          <a:off x="22221" y="287383"/>
+          <a:ext cx="10557509" cy="6827520"/>
         </p:xfrm>
         <a:graphic>
           <a:graphicData uri="http://schemas.openxmlformats.org/drawingml/2006/table">
@@ -12918,7 +12884,7 @@
                   </a:extLst>
                 </a:gridCol>
               </a:tblGrid>
-              <a:tr h="4800959">
+              <a:tr h="6377522">
                 <a:tc>
                   <a:txBody>
                     <a:bodyPr/>
@@ -12927,6 +12893,30 @@
                       <a:endParaRPr lang="en-US" sz="2800" dirty="0">
                         <a:latin typeface="Consolas" panose="020B0609020204030204" pitchFamily="49" charset="0"/>
                       </a:endParaRPr>
+                    </a:p>
+                    <a:p>
+                      <a:pPr algn="l"/>
+                      <a:r>
+                        <a:rPr lang="en-US" sz="2800" dirty="0">
+                          <a:solidFill>
+                            <a:srgbClr val="000000"/>
+                          </a:solidFill>
+                          <a:latin typeface="Consolas" panose="020B0609020204030204" pitchFamily="49" charset="0"/>
+                        </a:rPr>
+                        <a:t>    </a:t>
+                      </a:r>
+                    </a:p>
+                    <a:p>
+                      <a:pPr algn="l"/>
+                      <a:r>
+                        <a:rPr lang="en-US" sz="2800" dirty="0">
+                          <a:solidFill>
+                            <a:srgbClr val="000000"/>
+                          </a:solidFill>
+                          <a:latin typeface="Consolas" panose="020B0609020204030204" pitchFamily="49" charset="0"/>
+                        </a:rPr>
+                        <a:t>    </a:t>
+                      </a:r>
                     </a:p>
                     <a:p>
                       <a:pPr algn="l"/>
@@ -13322,7 +13312,7 @@
           <a:p>
             <a:fld id="{A7119916-CD40-456D-ABE3-55F8822671F7}" type="datetime1">
               <a:rPr lang="en-US" smtClean="0"/>
-              <a:t>3/1/2023</a:t>
+              <a:t>2/2/2024</a:t>
             </a:fld>
             <a:endParaRPr lang="en-US" dirty="0"/>
           </a:p>
@@ -14018,7 +14008,7 @@
           <a:p>
             <a:fld id="{A7119916-CD40-456D-ABE3-55F8822671F7}" type="datetime1">
               <a:rPr lang="en-US" smtClean="0"/>
-              <a:t>3/1/2023</a:t>
+              <a:t>2/2/2024</a:t>
             </a:fld>
             <a:endParaRPr lang="en-US" dirty="0"/>
           </a:p>
@@ -14783,7 +14773,7 @@
           <a:p>
             <a:fld id="{A7119916-CD40-456D-ABE3-55F8822671F7}" type="datetime1">
               <a:rPr lang="en-US" smtClean="0"/>
-              <a:t>3/1/2023</a:t>
+              <a:t>2/2/2024</a:t>
             </a:fld>
             <a:endParaRPr lang="en-US" dirty="0"/>
           </a:p>
@@ -15105,7 +15095,7 @@
           <a:p>
             <a:fld id="{A7119916-CD40-456D-ABE3-55F8822671F7}" type="datetime1">
               <a:rPr lang="en-US" smtClean="0"/>
-              <a:t>3/1/2023</a:t>
+              <a:t>2/2/2024</a:t>
             </a:fld>
             <a:endParaRPr lang="en-US" dirty="0"/>
           </a:p>
@@ -15447,7 +15437,7 @@
                 <a:tabLst/>
                 <a:defRPr/>
               </a:pPr>
-              <a:t>3/1/2023</a:t>
+              <a:t>2/2/2024</a:t>
             </a:fld>
             <a:endParaRPr kumimoji="0" lang="en-US" sz="900" b="0" i="0" u="none" strike="noStrike" kern="1200" cap="none" spc="0" normalizeH="0" baseline="0" noProof="0" dirty="0">
               <a:ln>
@@ -15756,7 +15746,7 @@
                   <a:schemeClr val="tx2"/>
                 </a:solidFill>
               </a:rPr>
-              <a:t>Voice – uses pyttsx3 speech to text module</a:t>
+              <a:t>Voice – uses pyttsx3 text to speech module</a:t>
             </a:r>
           </a:p>
           <a:p>
@@ -15766,68 +15756,7 @@
                   <a:schemeClr val="tx2"/>
                 </a:solidFill>
               </a:rPr>
-              <a:t>Tones – github:</a:t>
-            </a:r>
-            <a:r>
-              <a:rPr lang="en-US" sz="3200" b="0" i="0" u="sng" dirty="0">
-                <a:solidFill>
-                  <a:schemeClr val="tx2"/>
-                </a:solidFill>
-                <a:effectLst/>
-                <a:latin typeface="-apple-system"/>
-                <a:hlinkClick r:id="rId2">
-                  <a:extLst>
-                    <a:ext uri="{A12FA001-AC4F-418D-AE19-62706E023703}">
-                      <ahyp:hlinkClr xmlns:ahyp="http://schemas.microsoft.com/office/drawing/2018/hyperlinkcolor" val="tx"/>
-                    </a:ext>
-                  </a:extLst>
-                </a:hlinkClick>
-              </a:rPr>
-              <a:t> </a:t>
-            </a:r>
-            <a:r>
-              <a:rPr lang="en-US" sz="3200" b="0" i="0" u="sng" dirty="0">
-                <a:solidFill>
-                  <a:srgbClr val="0070C0"/>
-                </a:solidFill>
-                <a:effectLst/>
-                <a:latin typeface="-apple-system"/>
-                <a:hlinkClick r:id="rId2">
-                  <a:extLst>
-                    <a:ext uri="{A12FA001-AC4F-418D-AE19-62706E023703}">
-                      <ahyp:hlinkClr xmlns:ahyp="http://schemas.microsoft.com/office/drawing/2018/hyperlinkcolor" val="tx"/>
-                    </a:ext>
-                  </a:extLst>
-                </a:hlinkClick>
-              </a:rPr>
-              <a:t>daviddavini</a:t>
-            </a:r>
-            <a:r>
-              <a:rPr lang="en-US" sz="3200" b="0" i="0" dirty="0">
-                <a:solidFill>
-                  <a:srgbClr val="0070C0"/>
-                </a:solidFill>
-                <a:effectLst/>
-                <a:latin typeface="-apple-system"/>
-              </a:rPr>
-              <a:t>/</a:t>
-            </a:r>
-            <a:r>
-              <a:rPr lang="en-US" sz="3200" b="1" i="0" u="none" strike="noStrike" dirty="0">
-                <a:solidFill>
-                  <a:srgbClr val="0070C0"/>
-                </a:solidFill>
-                <a:effectLst/>
-                <a:latin typeface="-apple-system"/>
-                <a:hlinkClick r:id="rId3">
-                  <a:extLst>
-                    <a:ext uri="{A12FA001-AC4F-418D-AE19-62706E023703}">
-                      <ahyp:hlinkClr xmlns:ahyp="http://schemas.microsoft.com/office/drawing/2018/hyperlinkcolor" val="tx"/>
-                    </a:ext>
-                  </a:extLst>
-                </a:hlinkClick>
-              </a:rPr>
-              <a:t>pysinewave</a:t>
+              <a:t>Tones</a:t>
             </a:r>
             <a:endParaRPr lang="en-US" sz="3200" b="1" i="0" u="none" strike="noStrike" dirty="0">
               <a:solidFill>
@@ -15840,6 +15769,36 @@
           <a:p>
             <a:pPr lvl="1"/>
             <a:r>
+              <a:rPr lang="en-US" sz="3200" dirty="0">
+                <a:solidFill>
+                  <a:schemeClr val="tx2"/>
+                </a:solidFill>
+                <a:latin typeface="-apple-system"/>
+              </a:rPr>
+              <a:t>sounddevice – playing </a:t>
+            </a:r>
+            <a:r>
+              <a:rPr lang="en-US" sz="3200" dirty="0" err="1">
+                <a:solidFill>
+                  <a:schemeClr val="tx2"/>
+                </a:solidFill>
+                <a:latin typeface="-apple-system"/>
+              </a:rPr>
+              <a:t>numpy</a:t>
+            </a:r>
+            <a:r>
+              <a:rPr lang="en-US" sz="3200" dirty="0">
+                <a:solidFill>
+                  <a:schemeClr val="tx2"/>
+                </a:solidFill>
+                <a:latin typeface="-apple-system"/>
+              </a:rPr>
+              <a:t> arrays</a:t>
+            </a:r>
+          </a:p>
+          <a:p>
+            <a:pPr lvl="1"/>
+            <a:r>
               <a:rPr lang="en-US" sz="3200" b="1" i="0" u="none" strike="noStrike" dirty="0">
                 <a:solidFill>
                   <a:schemeClr val="tx2"/>
@@ -15857,19 +15816,7 @@
                 <a:effectLst/>
                 <a:latin typeface="-apple-system"/>
               </a:rPr>
-              <a:t>pysinewave_master – PYPI: not new enough</a:t>
-            </a:r>
-          </a:p>
-          <a:p>
-            <a:pPr lvl="1"/>
-            <a:r>
-              <a:rPr lang="en-US" sz="3200" dirty="0">
-                <a:solidFill>
-                  <a:schemeClr val="tx2"/>
-                </a:solidFill>
-                <a:latin typeface="-apple-system"/>
-              </a:rPr>
-              <a:t>async, stereo</a:t>
+              <a:t>pysinewave – pitch to frequency arithmetic</a:t>
             </a:r>
           </a:p>
           <a:p>
@@ -15913,7 +15860,7 @@
           <a:p>
             <a:fld id="{A7119916-CD40-456D-ABE3-55F8822671F7}" type="datetime1">
               <a:rPr lang="en-US" smtClean="0"/>
-              <a:t>3/1/2023</a:t>
+              <a:t>2/2/2024</a:t>
             </a:fld>
             <a:endParaRPr lang="en-US" dirty="0"/>
           </a:p>
@@ -15999,7 +15946,7 @@
           <p:nvPr/>
         </p:nvPicPr>
         <p:blipFill>
-          <a:blip r:embed="rId4">
+          <a:blip r:embed="rId2">
             <a:extLst>
               <a:ext uri="{28A0092B-C50C-407E-A947-70E740481C1C}">
                 <a14:useLocalDpi xmlns:a14="http://schemas.microsoft.com/office/drawing/2010/main" val="0"/>
@@ -16290,7 +16237,7 @@
           <a:p>
             <a:fld id="{A7119916-CD40-456D-ABE3-55F8822671F7}" type="datetime1">
               <a:rPr lang="en-US" smtClean="0"/>
-              <a:t>3/1/2023</a:t>
+              <a:t>2/2/2024</a:t>
             </a:fld>
             <a:endParaRPr lang="en-US" dirty="0"/>
           </a:p>
@@ -16661,7 +16608,7 @@
                 <a:tabLst/>
                 <a:defRPr/>
               </a:pPr>
-              <a:t>3/1/2023</a:t>
+              <a:t>2/2/2024</a:t>
             </a:fld>
             <a:endParaRPr kumimoji="0" lang="en-US" sz="900" b="0" i="0" u="none" strike="noStrike" kern="1200" cap="none" spc="0" normalizeH="0" baseline="0" noProof="0" dirty="0">
               <a:ln>
@@ -17118,7 +17065,7 @@
                 <a:tabLst/>
                 <a:defRPr/>
               </a:pPr>
-              <a:t>3/1/2023</a:t>
+              <a:t>2/2/2024</a:t>
             </a:fld>
             <a:endParaRPr kumimoji="0" lang="en-US" sz="900" b="0" i="0" u="none" strike="noStrike" kern="1200" cap="none" spc="0" normalizeH="0" baseline="0" noProof="0" dirty="0">
               <a:ln>
@@ -17557,7 +17504,7 @@
           <a:p>
             <a:fld id="{A7119916-CD40-456D-ABE3-55F8822671F7}" type="datetime1">
               <a:rPr lang="en-US" smtClean="0"/>
-              <a:t>3/1/2023</a:t>
+              <a:t>2/2/2024</a:t>
             </a:fld>
             <a:endParaRPr lang="en-US" dirty="0"/>
           </a:p>
@@ -17851,7 +17798,7 @@
                 <a:tabLst/>
                 <a:defRPr/>
               </a:pPr>
-              <a:t>3/1/2023</a:t>
+              <a:t>2/2/2024</a:t>
             </a:fld>
             <a:endParaRPr kumimoji="0" lang="en-US" sz="900" b="0" i="0" u="none" strike="noStrike" kern="1200" cap="none" spc="0" normalizeH="0" baseline="0" noProof="0" dirty="0">
               <a:ln>
@@ -18234,7 +18181,7 @@
                 <a:tabLst/>
                 <a:defRPr/>
               </a:pPr>
-              <a:t>3/1/2023</a:t>
+              <a:t>2/2/2024</a:t>
             </a:fld>
             <a:endParaRPr kumimoji="0" lang="en-US" sz="900" b="0" i="0" u="none" strike="noStrike" kern="1200" cap="none" spc="0" normalizeH="0" baseline="0" noProof="0" dirty="0">
               <a:ln>
@@ -18605,7 +18552,7 @@
                 <a:tabLst/>
                 <a:defRPr/>
               </a:pPr>
-              <a:t>3/1/2023</a:t>
+              <a:t>2/2/2024</a:t>
             </a:fld>
             <a:endParaRPr kumimoji="0" lang="en-US" sz="900" b="0" i="0" u="none" strike="noStrike" kern="1200" cap="none" spc="0" normalizeH="0" baseline="0" noProof="0" dirty="0">
               <a:ln>
@@ -19112,7 +19059,7 @@
                 <a:tabLst/>
                 <a:defRPr/>
               </a:pPr>
-              <a:t>3/1/2023</a:t>
+              <a:t>2/2/2024</a:t>
             </a:fld>
             <a:endParaRPr kumimoji="0" lang="en-US" sz="900" b="0" i="0" u="none" strike="noStrike" kern="1200" cap="none" spc="0" normalizeH="0" baseline="0" noProof="0" dirty="0">
               <a:ln>
@@ -19479,7 +19426,7 @@
                 <a:tabLst/>
                 <a:defRPr/>
               </a:pPr>
-              <a:t>3/1/2023</a:t>
+              <a:t>2/2/2024</a:t>
             </a:fld>
             <a:endParaRPr kumimoji="0" lang="en-US" sz="900" b="0" i="0" u="none" strike="noStrike" kern="1200" cap="none" spc="0" normalizeH="0" baseline="0" noProof="0" dirty="0">
               <a:ln>
@@ -19972,7 +19919,7 @@
                 <a:tabLst/>
                 <a:defRPr/>
               </a:pPr>
-              <a:t>3/1/2023</a:t>
+              <a:t>2/2/2024</a:t>
             </a:fld>
             <a:endParaRPr kumimoji="0" lang="en-US" sz="900" b="0" i="0" u="none" strike="noStrike" kern="1200" cap="none" spc="0" normalizeH="0" baseline="0" noProof="0" dirty="0">
               <a:ln>
@@ -20271,7 +20218,7 @@
           <a:p>
             <a:fld id="{A7119916-CD40-456D-ABE3-55F8822671F7}" type="datetime1">
               <a:rPr lang="en-US" smtClean="0"/>
-              <a:t>3/1/2023</a:t>
+              <a:t>2/2/2024</a:t>
             </a:fld>
             <a:endParaRPr lang="en-US" dirty="0"/>
           </a:p>
@@ -20649,7 +20596,7 @@
           <a:p>
             <a:fld id="{A7119916-CD40-456D-ABE3-55F8822671F7}" type="datetime1">
               <a:rPr lang="en-US" smtClean="0"/>
-              <a:t>3/1/2023</a:t>
+              <a:t>2/2/2024</a:t>
             </a:fld>
             <a:endParaRPr lang="en-US" dirty="0"/>
           </a:p>

</xml_diff>